<commit_message>
fetch type lazy loaded
</commit_message>
<xml_diff>
--- a/Hibernate.pptx
+++ b/Hibernate.pptx
@@ -315,7 +315,7 @@
           <a:p>
             <a:fld id="{8F235549-BF0A-4B98-8561-3786244E808C}" type="datetimeFigureOut">
               <a:rPr lang="en-US" smtClean="0"/>
-              <a:t>1/25/2018</a:t>
+              <a:t>2/4/2018</a:t>
             </a:fld>
             <a:endParaRPr lang="en-US"/>
           </a:p>
@@ -515,7 +515,7 @@
           <a:p>
             <a:fld id="{8F235549-BF0A-4B98-8561-3786244E808C}" type="datetimeFigureOut">
               <a:rPr lang="en-US" smtClean="0"/>
-              <a:t>1/25/2018</a:t>
+              <a:t>2/4/2018</a:t>
             </a:fld>
             <a:endParaRPr lang="en-US"/>
           </a:p>
@@ -690,7 +690,7 @@
           <a:p>
             <a:fld id="{8F235549-BF0A-4B98-8561-3786244E808C}" type="datetimeFigureOut">
               <a:rPr lang="en-US" smtClean="0"/>
-              <a:t>1/25/2018</a:t>
+              <a:t>2/4/2018</a:t>
             </a:fld>
             <a:endParaRPr lang="en-US"/>
           </a:p>
@@ -855,7 +855,7 @@
           <a:p>
             <a:fld id="{8F235549-BF0A-4B98-8561-3786244E808C}" type="datetimeFigureOut">
               <a:rPr lang="en-US" smtClean="0"/>
-              <a:t>1/25/2018</a:t>
+              <a:t>2/4/2018</a:t>
             </a:fld>
             <a:endParaRPr lang="en-US"/>
           </a:p>
@@ -1103,7 +1103,7 @@
           <a:p>
             <a:fld id="{8F235549-BF0A-4B98-8561-3786244E808C}" type="datetimeFigureOut">
               <a:rPr lang="en-US" smtClean="0"/>
-              <a:t>1/25/2018</a:t>
+              <a:t>2/4/2018</a:t>
             </a:fld>
             <a:endParaRPr lang="en-US"/>
           </a:p>
@@ -1421,7 +1421,7 @@
           <a:p>
             <a:fld id="{8F235549-BF0A-4B98-8561-3786244E808C}" type="datetimeFigureOut">
               <a:rPr lang="en-US" smtClean="0"/>
-              <a:t>1/25/2018</a:t>
+              <a:t>2/4/2018</a:t>
             </a:fld>
             <a:endParaRPr lang="en-US"/>
           </a:p>
@@ -1887,7 +1887,7 @@
           <a:p>
             <a:fld id="{8F235549-BF0A-4B98-8561-3786244E808C}" type="datetimeFigureOut">
               <a:rPr lang="en-US" smtClean="0"/>
-              <a:t>1/25/2018</a:t>
+              <a:t>2/4/2018</a:t>
             </a:fld>
             <a:endParaRPr lang="en-US"/>
           </a:p>
@@ -2035,7 +2035,7 @@
           <a:p>
             <a:fld id="{8F235549-BF0A-4B98-8561-3786244E808C}" type="datetimeFigureOut">
               <a:rPr lang="en-US" smtClean="0"/>
-              <a:t>1/25/2018</a:t>
+              <a:t>2/4/2018</a:t>
             </a:fld>
             <a:endParaRPr lang="en-US"/>
           </a:p>
@@ -2125,7 +2125,7 @@
           <a:p>
             <a:fld id="{8F235549-BF0A-4B98-8561-3786244E808C}" type="datetimeFigureOut">
               <a:rPr lang="en-US" smtClean="0"/>
-              <a:t>1/25/2018</a:t>
+              <a:t>2/4/2018</a:t>
             </a:fld>
             <a:endParaRPr lang="en-US"/>
           </a:p>
@@ -2399,7 +2399,7 @@
           <a:p>
             <a:fld id="{8F235549-BF0A-4B98-8561-3786244E808C}" type="datetimeFigureOut">
               <a:rPr lang="en-US" smtClean="0"/>
-              <a:t>1/25/2018</a:t>
+              <a:t>2/4/2018</a:t>
             </a:fld>
             <a:endParaRPr lang="en-US"/>
           </a:p>
@@ -2704,7 +2704,7 @@
           <a:p>
             <a:fld id="{8F235549-BF0A-4B98-8561-3786244E808C}" type="datetimeFigureOut">
               <a:rPr lang="en-US" smtClean="0"/>
-              <a:t>1/25/2018</a:t>
+              <a:t>2/4/2018</a:t>
             </a:fld>
             <a:endParaRPr lang="en-US"/>
           </a:p>
@@ -3002,7 +3002,7 @@
           <a:p>
             <a:fld id="{8F235549-BF0A-4B98-8561-3786244E808C}" type="datetimeFigureOut">
               <a:rPr lang="en-US" smtClean="0"/>
-              <a:t>1/25/2018</a:t>
+              <a:t>2/4/2018</a:t>
             </a:fld>
             <a:endParaRPr lang="en-US"/>
           </a:p>
@@ -5405,7 +5405,7 @@
             <a:r>
               <a:rPr lang="en-GB" sz="1600" b="1" dirty="0">
                 <a:solidFill>
-                  <a:srgbClr val="00B050"/>
+                  <a:srgbClr val="FF0000"/>
                 </a:solidFill>
               </a:rPr>
               <a:t>lazy loading is by default</a:t>

</xml_diff>